<commit_message>
Finish day 1 morning
</commit_message>
<xml_diff>
--- a/day1/lecture1_optimization_eng.pptx
+++ b/day1/lecture1_optimization_eng.pptx
@@ -5,7 +5,7 @@
     <p:sldMasterId id="2147483660" r:id="rId1"/>
   </p:sldMasterIdLst>
   <p:notesMasterIdLst>
-    <p:notesMasterId r:id="rId17"/>
+    <p:notesMasterId r:id="rId20"/>
   </p:notesMasterIdLst>
   <p:sldIdLst>
     <p:sldId id="256" r:id="rId2"/>
@@ -18,11 +18,14 @@
     <p:sldId id="284" r:id="rId9"/>
     <p:sldId id="285" r:id="rId10"/>
     <p:sldId id="288" r:id="rId11"/>
-    <p:sldId id="266" r:id="rId12"/>
-    <p:sldId id="286" r:id="rId13"/>
-    <p:sldId id="287" r:id="rId14"/>
-    <p:sldId id="274" r:id="rId15"/>
-    <p:sldId id="283" r:id="rId16"/>
+    <p:sldId id="289" r:id="rId12"/>
+    <p:sldId id="290" r:id="rId13"/>
+    <p:sldId id="266" r:id="rId14"/>
+    <p:sldId id="291" r:id="rId15"/>
+    <p:sldId id="286" r:id="rId16"/>
+    <p:sldId id="287" r:id="rId17"/>
+    <p:sldId id="292" r:id="rId18"/>
+    <p:sldId id="283" r:id="rId19"/>
   </p:sldIdLst>
   <p:sldSz cx="9144000" cy="6858000" type="screen4x3"/>
   <p:notesSz cx="6858000" cy="9144000"/>
@@ -226,7 +229,7 @@
           <a:p>
             <a:fld id="{9EC8F33C-A7AA-43A7-BCA9-F081EA0B4664}" type="datetimeFigureOut">
               <a:rPr lang="en-US" smtClean="0"/>
-              <a:t>1/4/2022</a:t>
+              <a:t>1/5/2022</a:t>
             </a:fld>
             <a:endParaRPr lang="en-US"/>
           </a:p>
@@ -575,7 +578,7 @@
           </a:ln>
           <a:extLst>
             <a:ext uri="{909E8E84-426E-40dd-AFC4-6F175D3DCCD1}">
-              <a14:hiddenFill xmlns="" xmlns:a14="http://schemas.microsoft.com/office/drawing/2010/main">
+              <a14:hiddenFill xmlns:a14="http://schemas.microsoft.com/office/drawing/2010/main" xmlns="">
                 <a:solidFill>
                   <a:srgbClr val="FFFFFF"/>
                 </a:solidFill>
@@ -618,7 +621,7 @@
           </a:ln>
           <a:extLst>
             <a:ext uri="{909E8E84-426E-40dd-AFC4-6F175D3DCCD1}">
-              <a14:hiddenFill xmlns="" xmlns:a14="http://schemas.microsoft.com/office/drawing/2010/main">
+              <a14:hiddenFill xmlns:a14="http://schemas.microsoft.com/office/drawing/2010/main" xmlns="">
                 <a:noFill/>
               </a14:hiddenFill>
             </a:ext>
@@ -717,7 +720,7 @@
           <a:p>
             <a:fld id="{9A356AEA-056F-417E-9B38-4BA8743FE6C4}" type="datetime1">
               <a:rPr lang="en-US" smtClean="0"/>
-              <a:t>1/4/2022</a:t>
+              <a:t>1/5/2022</a:t>
             </a:fld>
             <a:endParaRPr lang="en-US"/>
           </a:p>
@@ -904,7 +907,7 @@
           <a:p>
             <a:fld id="{09867F7C-1948-4907-9EBC-DD38682B5188}" type="datetime1">
               <a:rPr lang="en-US" smtClean="0"/>
-              <a:t>1/4/2022</a:t>
+              <a:t>1/5/2022</a:t>
             </a:fld>
             <a:endParaRPr lang="en-US"/>
           </a:p>
@@ -1100,7 +1103,7 @@
           <a:p>
             <a:fld id="{A5996870-3492-4879-A20C-50CF7F25E309}" type="datetime1">
               <a:rPr lang="en-US" smtClean="0"/>
-              <a:t>1/4/2022</a:t>
+              <a:t>1/5/2022</a:t>
             </a:fld>
             <a:endParaRPr lang="en-US"/>
           </a:p>
@@ -1352,7 +1355,7 @@
           <a:p>
             <a:fld id="{3339509F-2835-4D20-8448-C5CCD453FC4A}" type="datetime1">
               <a:rPr lang="en-US" smtClean="0"/>
-              <a:t>1/4/2022</a:t>
+              <a:t>1/5/2022</a:t>
             </a:fld>
             <a:endParaRPr lang="en-US"/>
           </a:p>
@@ -1576,7 +1579,7 @@
           <a:p>
             <a:fld id="{7A6EDDDE-DBE4-4114-B865-EC3A2920782E}" type="datetime1">
               <a:rPr lang="en-US" smtClean="0"/>
-              <a:t>1/4/2022</a:t>
+              <a:t>1/5/2022</a:t>
             </a:fld>
             <a:endParaRPr lang="en-US"/>
           </a:p>
@@ -1884,7 +1887,7 @@
           <a:p>
             <a:fld id="{8DA96907-43AE-4B1E-B5FF-6853ADDA5697}" type="datetime1">
               <a:rPr lang="en-US" smtClean="0"/>
-              <a:t>1/4/2022</a:t>
+              <a:t>1/5/2022</a:t>
             </a:fld>
             <a:endParaRPr lang="en-US"/>
           </a:p>
@@ -2052,7 +2055,7 @@
           <a:p>
             <a:fld id="{2E65DF97-DE0F-4515-8F8D-0E1C627BC4E9}" type="datetime1">
               <a:rPr lang="en-US" smtClean="0"/>
-              <a:t>1/4/2022</a:t>
+              <a:t>1/5/2022</a:t>
             </a:fld>
             <a:endParaRPr lang="en-US"/>
           </a:p>
@@ -2364,7 +2367,7 @@
           <a:p>
             <a:fld id="{23B9FD00-80D5-4EA7-B536-8F4F2C3959C9}" type="datetime1">
               <a:rPr lang="en-US" smtClean="0"/>
-              <a:t>1/4/2022</a:t>
+              <a:t>1/5/2022</a:t>
             </a:fld>
             <a:endParaRPr lang="en-US"/>
           </a:p>
@@ -2676,7 +2679,7 @@
           <a:p>
             <a:fld id="{DAC77084-4DB4-4A23-9870-BF49183ACB4C}" type="datetime1">
               <a:rPr lang="en-US" smtClean="0"/>
-              <a:t>1/4/2022</a:t>
+              <a:t>1/5/2022</a:t>
             </a:fld>
             <a:endParaRPr lang="en-US"/>
           </a:p>
@@ -2862,7 +2865,7 @@
           <a:p>
             <a:fld id="{6E487ECE-0D8C-4AFB-BD35-997F06E0971C}" type="datetime1">
               <a:rPr lang="en-US" smtClean="0"/>
-              <a:t>1/4/2022</a:t>
+              <a:t>1/5/2022</a:t>
             </a:fld>
             <a:endParaRPr lang="en-US"/>
           </a:p>
@@ -3071,7 +3074,7 @@
           <a:p>
             <a:fld id="{D4F6DC8D-78A1-49CC-B033-F77D87B04958}" type="datetime1">
               <a:rPr lang="en-US" smtClean="0"/>
-              <a:t>1/4/2022</a:t>
+              <a:t>1/5/2022</a:t>
             </a:fld>
             <a:endParaRPr lang="en-US"/>
           </a:p>
@@ -3374,7 +3377,7 @@
           <a:p>
             <a:fld id="{3BCF4A7C-A413-48DA-9211-5240CAEE1DD4}" type="datetime1">
               <a:rPr lang="en-US" smtClean="0"/>
-              <a:t>1/4/2022</a:t>
+              <a:t>1/5/2022</a:t>
             </a:fld>
             <a:endParaRPr lang="en-US"/>
           </a:p>
@@ -3816,7 +3819,7 @@
           <a:p>
             <a:fld id="{AAE887C4-8D00-4515-BD6B-6D6B646F02F7}" type="datetime1">
               <a:rPr lang="en-US" smtClean="0"/>
-              <a:t>1/4/2022</a:t>
+              <a:t>1/5/2022</a:t>
             </a:fld>
             <a:endParaRPr lang="en-US"/>
           </a:p>
@@ -3951,7 +3954,7 @@
           <a:p>
             <a:fld id="{10C13C5A-776A-4D2B-A91E-2ACB7D90E7CC}" type="datetime1">
               <a:rPr lang="en-US" smtClean="0"/>
-              <a:t>1/4/2022</a:t>
+              <a:t>1/5/2022</a:t>
             </a:fld>
             <a:endParaRPr lang="en-US"/>
           </a:p>
@@ -4064,7 +4067,7 @@
           <a:p>
             <a:fld id="{00A5D59F-6FC3-492C-BAE3-F50C9D1FBA31}" type="datetime1">
               <a:rPr lang="en-US" smtClean="0"/>
-              <a:t>1/4/2022</a:t>
+              <a:t>1/5/2022</a:t>
             </a:fld>
             <a:endParaRPr lang="en-US"/>
           </a:p>
@@ -4357,7 +4360,7 @@
           <a:p>
             <a:fld id="{CD78B45F-E474-4F2F-801A-58FC9FE22655}" type="datetime1">
               <a:rPr lang="en-US" smtClean="0"/>
-              <a:t>1/4/2022</a:t>
+              <a:t>1/5/2022</a:t>
             </a:fld>
             <a:endParaRPr lang="en-US"/>
           </a:p>
@@ -4631,7 +4634,7 @@
           <a:p>
             <a:fld id="{FDF35450-A835-4587-8F84-782057674F92}" type="datetime1">
               <a:rPr lang="en-US" smtClean="0"/>
-              <a:t>1/4/2022</a:t>
+              <a:t>1/5/2022</a:t>
             </a:fld>
             <a:endParaRPr lang="en-US"/>
           </a:p>
@@ -4753,17 +4756,17 @@
           </a:ln>
           <a:extLst>
             <a:ext uri="{FAA26D3D-D897-4be2-8F04-BA451C77F1D7}">
-              <ma14:placeholderFlag xmlns="" xmlns:ma14="http://schemas.microsoft.com/office/mac/drawingml/2011/main" val="1"/>
+              <ma14:placeholderFlag xmlns:ma14="http://schemas.microsoft.com/office/mac/drawingml/2011/main" xmlns="" val="1"/>
             </a:ext>
             <a:ext uri="{909E8E84-426E-40dd-AFC4-6F175D3DCCD1}">
-              <a14:hiddenFill xmlns="" xmlns:a14="http://schemas.microsoft.com/office/drawing/2010/main">
+              <a14:hiddenFill xmlns:a14="http://schemas.microsoft.com/office/drawing/2010/main" xmlns="">
                 <a:solidFill>
                   <a:srgbClr val="FFFFFF"/>
                 </a:solidFill>
               </a14:hiddenFill>
             </a:ext>
             <a:ext uri="{91240B29-F687-4f45-9708-019B960494DF}">
-              <a14:hiddenLine xmlns="" xmlns:a14="http://schemas.microsoft.com/office/drawing/2010/main" w="9525">
+              <a14:hiddenLine xmlns:a14="http://schemas.microsoft.com/office/drawing/2010/main" xmlns="" w="9525">
                 <a:solidFill>
                   <a:srgbClr val="000000"/>
                 </a:solidFill>
@@ -4815,17 +4818,17 @@
           </a:ln>
           <a:extLst>
             <a:ext uri="{FAA26D3D-D897-4be2-8F04-BA451C77F1D7}">
-              <ma14:placeholderFlag xmlns="" xmlns:ma14="http://schemas.microsoft.com/office/mac/drawingml/2011/main" val="1"/>
+              <ma14:placeholderFlag xmlns:ma14="http://schemas.microsoft.com/office/mac/drawingml/2011/main" xmlns="" val="1"/>
             </a:ext>
             <a:ext uri="{909E8E84-426E-40dd-AFC4-6F175D3DCCD1}">
-              <a14:hiddenFill xmlns="" xmlns:a14="http://schemas.microsoft.com/office/drawing/2010/main">
+              <a14:hiddenFill xmlns:a14="http://schemas.microsoft.com/office/drawing/2010/main" xmlns="">
                 <a:solidFill>
                   <a:srgbClr val="FFFFFF"/>
                 </a:solidFill>
               </a14:hiddenFill>
             </a:ext>
             <a:ext uri="{91240B29-F687-4f45-9708-019B960494DF}">
-              <a14:hiddenLine xmlns="" xmlns:a14="http://schemas.microsoft.com/office/drawing/2010/main" w="9525">
+              <a14:hiddenLine xmlns:a14="http://schemas.microsoft.com/office/drawing/2010/main" xmlns="" w="9525">
                 <a:solidFill>
                   <a:srgbClr val="000000"/>
                 </a:solidFill>
@@ -4925,7 +4928,7 @@
           <a:p>
             <a:fld id="{F6803E09-2A09-4EEA-8E99-292225B5EDFC}" type="datetime1">
               <a:rPr lang="en-US" smtClean="0"/>
-              <a:t>1/4/2022</a:t>
+              <a:t>1/5/2022</a:t>
             </a:fld>
             <a:endParaRPr lang="en-US"/>
           </a:p>
@@ -5093,7 +5096,7 @@
           </a:ln>
           <a:extLst>
             <a:ext uri="{909E8E84-426E-40dd-AFC4-6F175D3DCCD1}">
-              <a14:hiddenFill xmlns="" xmlns:a14="http://schemas.microsoft.com/office/drawing/2010/main">
+              <a14:hiddenFill xmlns:a14="http://schemas.microsoft.com/office/drawing/2010/main" xmlns="">
                 <a:solidFill>
                   <a:srgbClr val="FFFFFF"/>
                 </a:solidFill>
@@ -5136,7 +5139,7 @@
           </a:ln>
           <a:extLst>
             <a:ext uri="{909E8E84-426E-40dd-AFC4-6F175D3DCCD1}">
-              <a14:hiddenFill xmlns="" xmlns:a14="http://schemas.microsoft.com/office/drawing/2010/main">
+              <a14:hiddenFill xmlns:a14="http://schemas.microsoft.com/office/drawing/2010/main" xmlns="">
                 <a:noFill/>
               </a14:hiddenFill>
             </a:ext>
@@ -5676,17 +5679,17 @@
           </a:ln>
           <a:extLst>
             <a:ext uri="{FAA26D3D-D897-4be2-8F04-BA451C77F1D7}">
-              <ma14:placeholderFlag xmlns="" xmlns:ma14="http://schemas.microsoft.com/office/mac/drawingml/2011/main" val="1"/>
+              <ma14:placeholderFlag xmlns:ma14="http://schemas.microsoft.com/office/mac/drawingml/2011/main" xmlns="" val="1"/>
             </a:ext>
             <a:ext uri="{909E8E84-426E-40dd-AFC4-6F175D3DCCD1}">
-              <a14:hiddenFill xmlns="" xmlns:a14="http://schemas.microsoft.com/office/drawing/2010/main">
+              <a14:hiddenFill xmlns:a14="http://schemas.microsoft.com/office/drawing/2010/main" xmlns="">
                 <a:solidFill>
                   <a:srgbClr val="FFFFFF"/>
                 </a:solidFill>
               </a14:hiddenFill>
             </a:ext>
             <a:ext uri="{91240B29-F687-4f45-9708-019B960494DF}">
-              <a14:hiddenLine xmlns="" xmlns:a14="http://schemas.microsoft.com/office/drawing/2010/main" w="9525">
+              <a14:hiddenLine xmlns:a14="http://schemas.microsoft.com/office/drawing/2010/main" xmlns="" w="9525">
                 <a:solidFill>
                   <a:srgbClr val="000000"/>
                 </a:solidFill>
@@ -6051,8 +6054,19 @@
             <a:pPr lvl="1"/>
             <a:r>
               <a:rPr lang="en-US" dirty="0" smtClean="0"/>
-              <a:t>For any x we can calculate f(x) and f’(x)</a:t>
-            </a:r>
+              <a:t>For any x we can calculate f(x) and f’(x</a:t>
+            </a:r>
+            <a:r>
+              <a:rPr lang="en-US" dirty="0" smtClean="0"/>
+              <a:t>)</a:t>
+            </a:r>
+          </a:p>
+          <a:p>
+            <a:r>
+              <a:rPr lang="en-US" dirty="0" smtClean="0"/>
+              <a:t>[Demo in R]</a:t>
+            </a:r>
+            <a:endParaRPr lang="en-US" dirty="0" smtClean="0"/>
           </a:p>
           <a:p>
             <a:pPr marL="0" indent="0">
@@ -6098,7 +6112,7 @@
             <a:pPr marL="0" indent="0">
               <a:buNone/>
             </a:pPr>
-            <a:endParaRPr lang="en-US" smtClean="0"/>
+            <a:endParaRPr lang="en-US" dirty="0" smtClean="0"/>
           </a:p>
           <a:p>
             <a:pPr marL="0" indent="0">
@@ -6163,13 +6177,7 @@
       </p:grpSpPr>
       <p:sp>
         <p:nvSpPr>
-          <p:cNvPr id="2" name="Title 1">
-            <a:extLst>
-              <a:ext uri="{FF2B5EF4-FFF2-40B4-BE49-F238E27FC236}">
-                <a16:creationId xmlns:a16="http://schemas.microsoft.com/office/drawing/2014/main" id="{316697D2-66C8-404D-8665-0DF135418161}"/>
-              </a:ext>
-            </a:extLst>
-          </p:cNvPr>
+          <p:cNvPr id="2" name="Title 1"/>
           <p:cNvSpPr>
             <a:spLocks noGrp="1"/>
           </p:cNvSpPr>
@@ -6183,21 +6191,20 @@
           <a:lstStyle/>
           <a:p>
             <a:r>
-              <a:rPr lang="en-US" dirty="0"/>
-              <a:t>Optimizers in R</a:t>
-            </a:r>
-          </a:p>
-        </p:txBody>
-      </p:sp>
-      <p:sp>
-        <p:nvSpPr>
-          <p:cNvPr id="3" name="Content Placeholder 2">
-            <a:extLst>
-              <a:ext uri="{FF2B5EF4-FFF2-40B4-BE49-F238E27FC236}">
-                <a16:creationId xmlns:a16="http://schemas.microsoft.com/office/drawing/2014/main" id="{D5056ACD-427A-4189-B3CB-53C097C85E0F}"/>
-              </a:ext>
-            </a:extLst>
-          </p:cNvPr>
+              <a:rPr lang="en-US" dirty="0" smtClean="0"/>
+              <a:t>Function minimization in </a:t>
+            </a:r>
+            <a:r>
+              <a:rPr lang="en-US" dirty="0" smtClean="0"/>
+              <a:t>TMB</a:t>
+            </a:r>
+            <a:endParaRPr lang="en-US" dirty="0"/>
+          </a:p>
+        </p:txBody>
+      </p:sp>
+      <p:sp>
+        <p:nvSpPr>
+          <p:cNvPr id="3" name="Content Placeholder 2"/>
           <p:cNvSpPr>
             <a:spLocks noGrp="1"/>
           </p:cNvSpPr>
@@ -6211,75 +6218,184 @@
           <a:lstStyle/>
           <a:p>
             <a:r>
-              <a:rPr lang="en-US" dirty="0"/>
-              <a:t>R offers </a:t>
-            </a:r>
-            <a:r>
-              <a:rPr lang="en-US" b="1" dirty="0"/>
-              <a:t>many</a:t>
-            </a:r>
-            <a:r>
-              <a:rPr lang="en-US" dirty="0"/>
-              <a:t> numerical optimizers with different advantages/disadvantages</a:t>
-            </a:r>
-          </a:p>
-          <a:p>
-            <a:r>
-              <a:rPr lang="en-US" dirty="0"/>
-              <a:t>We will use </a:t>
-            </a:r>
-            <a:r>
-              <a:rPr lang="en-US" dirty="0" err="1">
+              <a:rPr lang="en-US" dirty="0" smtClean="0"/>
+              <a:t>Let f(x)=(</a:t>
+            </a:r>
+            <a:r>
+              <a:rPr lang="en-US" dirty="0" smtClean="0"/>
+              <a:t>a-x)^2+(</a:t>
+            </a:r>
+            <a:r>
+              <a:rPr lang="en-US" dirty="0" smtClean="0"/>
+              <a:t>b-x)^</a:t>
+            </a:r>
+            <a:r>
+              <a:rPr lang="en-US" dirty="0" smtClean="0"/>
+              <a:t>2+(</a:t>
+            </a:r>
+            <a:r>
+              <a:rPr lang="en-US" dirty="0" smtClean="0"/>
+              <a:t>c-x)^2</a:t>
+            </a:r>
+          </a:p>
+          <a:p>
+            <a:pPr lvl="1"/>
+            <a:r>
+              <a:rPr lang="en-US" dirty="0" err="1" smtClean="0"/>
+              <a:t>a,b,c</a:t>
+            </a:r>
+            <a:r>
+              <a:rPr lang="en-US" dirty="0" smtClean="0"/>
+              <a:t> = {0.113, -0.240, 0.583} are constants</a:t>
+            </a:r>
+          </a:p>
+          <a:p>
+            <a:pPr lvl="1"/>
+            <a:r>
+              <a:rPr lang="en-US" dirty="0" smtClean="0"/>
+              <a:t>For any x we can calculate f(x) and f’(x</a:t>
+            </a:r>
+            <a:r>
+              <a:rPr lang="en-US" dirty="0" smtClean="0"/>
+              <a:t>)</a:t>
+            </a:r>
+          </a:p>
+          <a:p>
+            <a:r>
+              <a:rPr lang="en-US" dirty="0" smtClean="0"/>
+              <a:t>[Demo in R]</a:t>
+            </a:r>
+            <a:endParaRPr lang="en-US" dirty="0" smtClean="0"/>
+          </a:p>
+          <a:p>
+            <a:pPr marL="0" indent="0">
+              <a:buNone/>
+            </a:pPr>
+            <a:r>
+              <a:rPr lang="en-US" sz="1800" dirty="0" smtClean="0">
                 <a:latin typeface="Courier New" panose="02070309020205020404" pitchFamily="49" charset="0"/>
                 <a:cs typeface="Courier New" panose="02070309020205020404" pitchFamily="49" charset="0"/>
               </a:rPr>
-              <a:t>nlminb</a:t>
-            </a:r>
-            <a:r>
-              <a:rPr lang="en-US" dirty="0"/>
-              <a:t> but can also use </a:t>
-            </a:r>
-            <a:r>
-              <a:rPr lang="en-US" dirty="0" err="1">
+              <a:t>#</a:t>
+            </a:r>
+            <a:r>
+              <a:rPr lang="en-US" sz="1800" dirty="0">
                 <a:latin typeface="Courier New" panose="02070309020205020404" pitchFamily="49" charset="0"/>
                 <a:cs typeface="Courier New" panose="02070309020205020404" pitchFamily="49" charset="0"/>
               </a:rPr>
-              <a:t>optim</a:t>
-            </a:r>
-            <a:endParaRPr lang="en-US" dirty="0">
-              <a:latin typeface="Courier New" panose="02070309020205020404" pitchFamily="49" charset="0"/>
-              <a:cs typeface="Courier New" panose="02070309020205020404" pitchFamily="49" charset="0"/>
-            </a:endParaRPr>
-          </a:p>
-          <a:p>
-            <a:r>
-              <a:rPr lang="en-US" dirty="0"/>
-              <a:t>Allows use of box constraints (more later)</a:t>
-            </a:r>
-          </a:p>
-          <a:p>
-            <a:r>
-              <a:rPr lang="en-US" dirty="0"/>
-              <a:t>We pass it a NLL function, it gives us the parameters that minimize it</a:t>
-            </a:r>
-          </a:p>
-          <a:p>
-            <a:r>
-              <a:rPr lang="en-US" dirty="0"/>
-              <a:t>Reminder: accurate gradients really improve optimizer performance</a:t>
-            </a:r>
-          </a:p>
-        </p:txBody>
-      </p:sp>
-      <p:sp>
-        <p:nvSpPr>
-          <p:cNvPr id="4" name="Slide Number Placeholder 3">
-            <a:extLst>
-              <a:ext uri="{FF2B5EF4-FFF2-40B4-BE49-F238E27FC236}">
-                <a16:creationId xmlns:a16="http://schemas.microsoft.com/office/drawing/2014/main" id="{957B730D-CC40-431E-8C8E-D2D52D730BC9}"/>
-              </a:ext>
-            </a:extLst>
-          </p:cNvPr>
+              <a:t>include &lt;TMB.hpp&gt;</a:t>
+            </a:r>
+          </a:p>
+          <a:p>
+            <a:pPr marL="0" indent="0">
+              <a:buNone/>
+            </a:pPr>
+            <a:r>
+              <a:rPr lang="en-US" sz="1800" dirty="0">
+                <a:latin typeface="Courier New" panose="02070309020205020404" pitchFamily="49" charset="0"/>
+                <a:cs typeface="Courier New" panose="02070309020205020404" pitchFamily="49" charset="0"/>
+              </a:rPr>
+              <a:t>template&lt;class Type&gt;</a:t>
+            </a:r>
+          </a:p>
+          <a:p>
+            <a:pPr marL="0" indent="0">
+              <a:buNone/>
+            </a:pPr>
+            <a:r>
+              <a:rPr lang="en-US" sz="1800" dirty="0">
+                <a:latin typeface="Courier New" panose="02070309020205020404" pitchFamily="49" charset="0"/>
+                <a:cs typeface="Courier New" panose="02070309020205020404" pitchFamily="49" charset="0"/>
+              </a:rPr>
+              <a:t>Type </a:t>
+            </a:r>
+            <a:r>
+              <a:rPr lang="en-US" sz="1800" dirty="0" err="1">
+                <a:latin typeface="Courier New" panose="02070309020205020404" pitchFamily="49" charset="0"/>
+                <a:cs typeface="Courier New" panose="02070309020205020404" pitchFamily="49" charset="0"/>
+              </a:rPr>
+              <a:t>objective_function</a:t>
+            </a:r>
+            <a:r>
+              <a:rPr lang="en-US" sz="1800" dirty="0">
+                <a:latin typeface="Courier New" panose="02070309020205020404" pitchFamily="49" charset="0"/>
+                <a:cs typeface="Courier New" panose="02070309020205020404" pitchFamily="49" charset="0"/>
+              </a:rPr>
+              <a:t>&lt;Type&gt;::operator() ()</a:t>
+            </a:r>
+          </a:p>
+          <a:p>
+            <a:pPr marL="0" indent="0">
+              <a:buNone/>
+            </a:pPr>
+            <a:r>
+              <a:rPr lang="en-US" sz="1800" dirty="0">
+                <a:latin typeface="Courier New" panose="02070309020205020404" pitchFamily="49" charset="0"/>
+                <a:cs typeface="Courier New" panose="02070309020205020404" pitchFamily="49" charset="0"/>
+              </a:rPr>
+              <a:t>{</a:t>
+            </a:r>
+          </a:p>
+          <a:p>
+            <a:pPr marL="0" indent="0">
+              <a:buNone/>
+            </a:pPr>
+            <a:r>
+              <a:rPr lang="en-US" sz="1800" dirty="0">
+                <a:latin typeface="Courier New" panose="02070309020205020404" pitchFamily="49" charset="0"/>
+                <a:cs typeface="Courier New" panose="02070309020205020404" pitchFamily="49" charset="0"/>
+              </a:rPr>
+              <a:t>  PARAMETER(x);	</a:t>
+            </a:r>
+          </a:p>
+          <a:p>
+            <a:pPr marL="0" indent="0">
+              <a:buNone/>
+            </a:pPr>
+            <a:r>
+              <a:rPr lang="en-US" sz="1800" dirty="0">
+                <a:latin typeface="Courier New" panose="02070309020205020404" pitchFamily="49" charset="0"/>
+                <a:cs typeface="Courier New" panose="02070309020205020404" pitchFamily="49" charset="0"/>
+              </a:rPr>
+              <a:t>  Type f=pow(x-0.113,2)+pow(x- -0.240,2)+pow(x-0.583,2);</a:t>
+            </a:r>
+          </a:p>
+          <a:p>
+            <a:pPr marL="0" indent="0">
+              <a:buNone/>
+            </a:pPr>
+            <a:r>
+              <a:rPr lang="en-US" sz="1800" dirty="0">
+                <a:latin typeface="Courier New" panose="02070309020205020404" pitchFamily="49" charset="0"/>
+                <a:cs typeface="Courier New" panose="02070309020205020404" pitchFamily="49" charset="0"/>
+              </a:rPr>
+              <a:t>  return f;</a:t>
+            </a:r>
+          </a:p>
+          <a:p>
+            <a:pPr marL="0" indent="0">
+              <a:buNone/>
+            </a:pPr>
+            <a:r>
+              <a:rPr lang="en-US" sz="1800" dirty="0" smtClean="0">
+                <a:latin typeface="Courier New" panose="02070309020205020404" pitchFamily="49" charset="0"/>
+                <a:cs typeface="Courier New" panose="02070309020205020404" pitchFamily="49" charset="0"/>
+              </a:rPr>
+              <a:t>}</a:t>
+            </a:r>
+            <a:endParaRPr lang="en-US" sz="2800" dirty="0" smtClean="0"/>
+          </a:p>
+          <a:p>
+            <a:pPr marL="0" indent="0">
+              <a:buNone/>
+            </a:pPr>
+            <a:endParaRPr lang="en-US" dirty="0" smtClean="0"/>
+          </a:p>
+        </p:txBody>
+      </p:sp>
+      <p:sp>
+        <p:nvSpPr>
+          <p:cNvPr id="4" name="Slide Number Placeholder 3"/>
           <p:cNvSpPr>
             <a:spLocks noGrp="1"/>
           </p:cNvSpPr>
@@ -6303,7 +6419,7 @@
     </p:spTree>
     <p:extLst>
       <p:ext uri="{BB962C8B-B14F-4D97-AF65-F5344CB8AC3E}">
-        <p14:creationId xmlns:p14="http://schemas.microsoft.com/office/powerpoint/2010/main" val="1967631098"/>
+        <p14:creationId xmlns:p14="http://schemas.microsoft.com/office/powerpoint/2010/main" val="1563531491"/>
       </p:ext>
     </p:extLst>
   </p:cSld>
@@ -6332,6 +6448,897 @@
       </p:grpSpPr>
       <p:sp>
         <p:nvSpPr>
+          <p:cNvPr id="2" name="Title 1"/>
+          <p:cNvSpPr>
+            <a:spLocks noGrp="1"/>
+          </p:cNvSpPr>
+          <p:nvPr>
+            <p:ph type="title"/>
+          </p:nvPr>
+        </p:nvSpPr>
+        <p:spPr/>
+        <p:txBody>
+          <a:bodyPr/>
+          <a:lstStyle/>
+          <a:p>
+            <a:r>
+              <a:rPr lang="en-US" dirty="0" smtClean="0"/>
+              <a:t>Function minimization in </a:t>
+            </a:r>
+            <a:r>
+              <a:rPr lang="en-US" dirty="0" smtClean="0"/>
+              <a:t>TMB</a:t>
+            </a:r>
+            <a:endParaRPr lang="en-US" dirty="0"/>
+          </a:p>
+        </p:txBody>
+      </p:sp>
+      <p:sp>
+        <p:nvSpPr>
+          <p:cNvPr id="3" name="Content Placeholder 2"/>
+          <p:cNvSpPr>
+            <a:spLocks noGrp="1"/>
+          </p:cNvSpPr>
+          <p:nvPr>
+            <p:ph idx="1"/>
+          </p:nvPr>
+        </p:nvSpPr>
+        <p:spPr/>
+        <p:txBody>
+          <a:bodyPr/>
+          <a:lstStyle/>
+          <a:p>
+            <a:r>
+              <a:rPr lang="en-US" dirty="0" smtClean="0"/>
+              <a:t>Let f(x)=(a-x)^2+(b-x)^2+(c-x)^2</a:t>
+            </a:r>
+          </a:p>
+          <a:p>
+            <a:pPr lvl="1"/>
+            <a:r>
+              <a:rPr lang="en-US" dirty="0" err="1" smtClean="0"/>
+              <a:t>a,b,c</a:t>
+            </a:r>
+            <a:r>
+              <a:rPr lang="en-US" dirty="0" smtClean="0"/>
+              <a:t> = {0.113, -0.240, 0.583} are constants</a:t>
+            </a:r>
+          </a:p>
+          <a:p>
+            <a:pPr lvl="1"/>
+            <a:r>
+              <a:rPr lang="en-US" dirty="0" smtClean="0"/>
+              <a:t>For any x we can calculate f(x) and f’(x</a:t>
+            </a:r>
+            <a:r>
+              <a:rPr lang="en-US" dirty="0" smtClean="0"/>
+              <a:t>)</a:t>
+            </a:r>
+          </a:p>
+          <a:p>
+            <a:r>
+              <a:rPr lang="en-US" dirty="0" smtClean="0"/>
+              <a:t>[Demo in R]</a:t>
+            </a:r>
+            <a:endParaRPr lang="en-US" dirty="0" smtClean="0"/>
+          </a:p>
+          <a:p>
+            <a:pPr marL="0" indent="0">
+              <a:buNone/>
+            </a:pPr>
+            <a:endParaRPr lang="en-US" sz="1800" dirty="0" smtClean="0">
+              <a:latin typeface="Courier New" panose="02070309020205020404" pitchFamily="49" charset="0"/>
+              <a:cs typeface="Courier New" panose="02070309020205020404" pitchFamily="49" charset="0"/>
+            </a:endParaRPr>
+          </a:p>
+          <a:p>
+            <a:pPr marL="0" indent="0">
+              <a:buNone/>
+            </a:pPr>
+            <a:r>
+              <a:rPr lang="en-US" sz="1800" dirty="0" smtClean="0">
+                <a:latin typeface="Courier New" panose="02070309020205020404" pitchFamily="49" charset="0"/>
+                <a:cs typeface="Courier New" panose="02070309020205020404" pitchFamily="49" charset="0"/>
+              </a:rPr>
+              <a:t>compile</a:t>
+            </a:r>
+            <a:r>
+              <a:rPr lang="en-US" sz="1800" dirty="0">
+                <a:latin typeface="Courier New" panose="02070309020205020404" pitchFamily="49" charset="0"/>
+                <a:cs typeface="Courier New" panose="02070309020205020404" pitchFamily="49" charset="0"/>
+              </a:rPr>
+              <a:t>("</a:t>
+            </a:r>
+            <a:r>
+              <a:rPr lang="en-US" sz="1800" dirty="0" err="1">
+                <a:latin typeface="Courier New" panose="02070309020205020404" pitchFamily="49" charset="0"/>
+                <a:cs typeface="Courier New" panose="02070309020205020404" pitchFamily="49" charset="0"/>
+              </a:rPr>
+              <a:t>TMB_models</a:t>
+            </a:r>
+            <a:r>
+              <a:rPr lang="en-US" sz="1800" dirty="0">
+                <a:latin typeface="Courier New" panose="02070309020205020404" pitchFamily="49" charset="0"/>
+                <a:cs typeface="Courier New" panose="02070309020205020404" pitchFamily="49" charset="0"/>
+              </a:rPr>
+              <a:t>/simple.cpp")</a:t>
+            </a:r>
+          </a:p>
+          <a:p>
+            <a:pPr marL="0" indent="0">
+              <a:buNone/>
+            </a:pPr>
+            <a:r>
+              <a:rPr lang="en-US" sz="1800" dirty="0" err="1">
+                <a:latin typeface="Courier New" panose="02070309020205020404" pitchFamily="49" charset="0"/>
+                <a:cs typeface="Courier New" panose="02070309020205020404" pitchFamily="49" charset="0"/>
+              </a:rPr>
+              <a:t>dyn.load</a:t>
+            </a:r>
+            <a:r>
+              <a:rPr lang="en-US" sz="1800" dirty="0">
+                <a:latin typeface="Courier New" panose="02070309020205020404" pitchFamily="49" charset="0"/>
+                <a:cs typeface="Courier New" panose="02070309020205020404" pitchFamily="49" charset="0"/>
+              </a:rPr>
+              <a:t>(</a:t>
+            </a:r>
+            <a:r>
+              <a:rPr lang="en-US" sz="1800" dirty="0" err="1">
+                <a:latin typeface="Courier New" panose="02070309020205020404" pitchFamily="49" charset="0"/>
+                <a:cs typeface="Courier New" panose="02070309020205020404" pitchFamily="49" charset="0"/>
+              </a:rPr>
+              <a:t>dynlib</a:t>
+            </a:r>
+            <a:r>
+              <a:rPr lang="en-US" sz="1800" dirty="0">
+                <a:latin typeface="Courier New" panose="02070309020205020404" pitchFamily="49" charset="0"/>
+                <a:cs typeface="Courier New" panose="02070309020205020404" pitchFamily="49" charset="0"/>
+              </a:rPr>
+              <a:t>("</a:t>
+            </a:r>
+            <a:r>
+              <a:rPr lang="en-US" sz="1800" dirty="0" err="1">
+                <a:latin typeface="Courier New" panose="02070309020205020404" pitchFamily="49" charset="0"/>
+                <a:cs typeface="Courier New" panose="02070309020205020404" pitchFamily="49" charset="0"/>
+              </a:rPr>
+              <a:t>TMB_models</a:t>
+            </a:r>
+            <a:r>
+              <a:rPr lang="en-US" sz="1800" dirty="0">
+                <a:latin typeface="Courier New" panose="02070309020205020404" pitchFamily="49" charset="0"/>
+                <a:cs typeface="Courier New" panose="02070309020205020404" pitchFamily="49" charset="0"/>
+              </a:rPr>
+              <a:t>/simple"))</a:t>
+            </a:r>
+          </a:p>
+          <a:p>
+            <a:pPr marL="0" indent="0">
+              <a:buNone/>
+            </a:pPr>
+            <a:r>
+              <a:rPr lang="en-US" sz="1800" dirty="0" err="1">
+                <a:latin typeface="Courier New" panose="02070309020205020404" pitchFamily="49" charset="0"/>
+                <a:cs typeface="Courier New" panose="02070309020205020404" pitchFamily="49" charset="0"/>
+              </a:rPr>
+              <a:t>obj</a:t>
+            </a:r>
+            <a:r>
+              <a:rPr lang="en-US" sz="1800" dirty="0">
+                <a:latin typeface="Courier New" panose="02070309020205020404" pitchFamily="49" charset="0"/>
+                <a:cs typeface="Courier New" panose="02070309020205020404" pitchFamily="49" charset="0"/>
+              </a:rPr>
+              <a:t> &lt;- </a:t>
+            </a:r>
+            <a:r>
+              <a:rPr lang="en-US" sz="1800" dirty="0" err="1">
+                <a:latin typeface="Courier New" panose="02070309020205020404" pitchFamily="49" charset="0"/>
+                <a:cs typeface="Courier New" panose="02070309020205020404" pitchFamily="49" charset="0"/>
+              </a:rPr>
+              <a:t>MakeADFun</a:t>
+            </a:r>
+            <a:r>
+              <a:rPr lang="en-US" sz="1800" dirty="0">
+                <a:latin typeface="Courier New" panose="02070309020205020404" pitchFamily="49" charset="0"/>
+                <a:cs typeface="Courier New" panose="02070309020205020404" pitchFamily="49" charset="0"/>
+              </a:rPr>
+              <a:t>(data=list(), parameters=list(x=1), </a:t>
+            </a:r>
+            <a:r>
+              <a:rPr lang="en-US" sz="1800" dirty="0" smtClean="0">
+                <a:latin typeface="Courier New" panose="02070309020205020404" pitchFamily="49" charset="0"/>
+                <a:cs typeface="Courier New" panose="02070309020205020404" pitchFamily="49" charset="0"/>
+              </a:rPr>
+              <a:t> 	  		    DLL</a:t>
+            </a:r>
+            <a:r>
+              <a:rPr lang="en-US" sz="1800" dirty="0">
+                <a:latin typeface="Courier New" panose="02070309020205020404" pitchFamily="49" charset="0"/>
+                <a:cs typeface="Courier New" panose="02070309020205020404" pitchFamily="49" charset="0"/>
+              </a:rPr>
+              <a:t>='simple')</a:t>
+            </a:r>
+          </a:p>
+          <a:p>
+            <a:pPr marL="0" indent="0">
+              <a:buNone/>
+            </a:pPr>
+            <a:r>
+              <a:rPr lang="en-US" sz="1800" dirty="0" err="1">
+                <a:latin typeface="Courier New" panose="02070309020205020404" pitchFamily="49" charset="0"/>
+                <a:cs typeface="Courier New" panose="02070309020205020404" pitchFamily="49" charset="0"/>
+              </a:rPr>
+              <a:t>obj$fn</a:t>
+            </a:r>
+            <a:r>
+              <a:rPr lang="en-US" sz="1800" dirty="0">
+                <a:latin typeface="Courier New" panose="02070309020205020404" pitchFamily="49" charset="0"/>
+                <a:cs typeface="Courier New" panose="02070309020205020404" pitchFamily="49" charset="0"/>
+              </a:rPr>
+              <a:t>(1)  # f(x)</a:t>
+            </a:r>
+          </a:p>
+          <a:p>
+            <a:pPr marL="0" indent="0">
+              <a:buNone/>
+            </a:pPr>
+            <a:r>
+              <a:rPr lang="en-US" sz="1800" dirty="0" err="1">
+                <a:latin typeface="Courier New" panose="02070309020205020404" pitchFamily="49" charset="0"/>
+                <a:cs typeface="Courier New" panose="02070309020205020404" pitchFamily="49" charset="0"/>
+              </a:rPr>
+              <a:t>obj$gr</a:t>
+            </a:r>
+            <a:r>
+              <a:rPr lang="en-US" sz="1800" dirty="0">
+                <a:latin typeface="Courier New" panose="02070309020205020404" pitchFamily="49" charset="0"/>
+                <a:cs typeface="Courier New" panose="02070309020205020404" pitchFamily="49" charset="0"/>
+              </a:rPr>
+              <a:t>(1)  # f'(x</a:t>
+            </a:r>
+            <a:r>
+              <a:rPr lang="en-US" sz="1800" dirty="0" smtClean="0">
+                <a:latin typeface="Courier New" panose="02070309020205020404" pitchFamily="49" charset="0"/>
+                <a:cs typeface="Courier New" panose="02070309020205020404" pitchFamily="49" charset="0"/>
+              </a:rPr>
+              <a:t>)</a:t>
+            </a:r>
+            <a:endParaRPr lang="en-US" dirty="0" smtClean="0"/>
+          </a:p>
+        </p:txBody>
+      </p:sp>
+      <p:sp>
+        <p:nvSpPr>
+          <p:cNvPr id="4" name="Slide Number Placeholder 3"/>
+          <p:cNvSpPr>
+            <a:spLocks noGrp="1"/>
+          </p:cNvSpPr>
+          <p:nvPr>
+            <p:ph type="sldNum" sz="quarter" idx="12"/>
+          </p:nvPr>
+        </p:nvSpPr>
+        <p:spPr/>
+        <p:txBody>
+          <a:bodyPr/>
+          <a:lstStyle/>
+          <a:p>
+            <a:fld id="{A90099C9-4CB8-9A40-B745-9AB270505907}" type="slidenum">
+              <a:rPr lang="en-US" smtClean="0"/>
+              <a:t>12</a:t>
+            </a:fld>
+            <a:endParaRPr lang="en-US"/>
+          </a:p>
+        </p:txBody>
+      </p:sp>
+    </p:spTree>
+    <p:extLst>
+      <p:ext uri="{BB962C8B-B14F-4D97-AF65-F5344CB8AC3E}">
+        <p14:creationId xmlns:p14="http://schemas.microsoft.com/office/powerpoint/2010/main" val="471831474"/>
+      </p:ext>
+    </p:extLst>
+  </p:cSld>
+  <p:clrMapOvr>
+    <a:masterClrMapping/>
+  </p:clrMapOvr>
+</p:sld>
+</file>
+
+<file path=ppt/slides/slide13.xml><?xml version="1.0" encoding="utf-8"?>
+<p:sld xmlns:a="http://schemas.openxmlformats.org/drawingml/2006/main" xmlns:r="http://schemas.openxmlformats.org/officeDocument/2006/relationships" xmlns:p="http://schemas.openxmlformats.org/presentationml/2006/main">
+  <p:cSld>
+    <p:spTree>
+      <p:nvGrpSpPr>
+        <p:cNvPr id="1" name=""/>
+        <p:cNvGrpSpPr/>
+        <p:nvPr/>
+      </p:nvGrpSpPr>
+      <p:grpSpPr>
+        <a:xfrm>
+          <a:off x="0" y="0"/>
+          <a:ext cx="0" cy="0"/>
+          <a:chOff x="0" y="0"/>
+          <a:chExt cx="0" cy="0"/>
+        </a:xfrm>
+      </p:grpSpPr>
+      <p:sp>
+        <p:nvSpPr>
+          <p:cNvPr id="2" name="Title 1">
+            <a:extLst>
+              <a:ext uri="{FF2B5EF4-FFF2-40B4-BE49-F238E27FC236}">
+                <a16:creationId xmlns:a16="http://schemas.microsoft.com/office/drawing/2014/main" id="{316697D2-66C8-404D-8665-0DF135418161}"/>
+              </a:ext>
+            </a:extLst>
+          </p:cNvPr>
+          <p:cNvSpPr>
+            <a:spLocks noGrp="1"/>
+          </p:cNvSpPr>
+          <p:nvPr>
+            <p:ph type="title"/>
+          </p:nvPr>
+        </p:nvSpPr>
+        <p:spPr/>
+        <p:txBody>
+          <a:bodyPr/>
+          <a:lstStyle/>
+          <a:p>
+            <a:r>
+              <a:rPr lang="en-US" dirty="0"/>
+              <a:t>Optimizers in R</a:t>
+            </a:r>
+          </a:p>
+        </p:txBody>
+      </p:sp>
+      <p:sp>
+        <p:nvSpPr>
+          <p:cNvPr id="3" name="Content Placeholder 2">
+            <a:extLst>
+              <a:ext uri="{FF2B5EF4-FFF2-40B4-BE49-F238E27FC236}">
+                <a16:creationId xmlns:a16="http://schemas.microsoft.com/office/drawing/2014/main" id="{D5056ACD-427A-4189-B3CB-53C097C85E0F}"/>
+              </a:ext>
+            </a:extLst>
+          </p:cNvPr>
+          <p:cNvSpPr>
+            <a:spLocks noGrp="1"/>
+          </p:cNvSpPr>
+          <p:nvPr>
+            <p:ph idx="1"/>
+          </p:nvPr>
+        </p:nvSpPr>
+        <p:spPr/>
+        <p:txBody>
+          <a:bodyPr/>
+          <a:lstStyle/>
+          <a:p>
+            <a:r>
+              <a:rPr lang="en-US" dirty="0"/>
+              <a:t>R offers </a:t>
+            </a:r>
+            <a:r>
+              <a:rPr lang="en-US" b="1" dirty="0"/>
+              <a:t>many</a:t>
+            </a:r>
+            <a:r>
+              <a:rPr lang="en-US" dirty="0"/>
+              <a:t> numerical optimizers with different advantages/disadvantages</a:t>
+            </a:r>
+          </a:p>
+          <a:p>
+            <a:r>
+              <a:rPr lang="en-US" dirty="0"/>
+              <a:t>We will use </a:t>
+            </a:r>
+            <a:r>
+              <a:rPr lang="en-US" dirty="0" err="1">
+                <a:latin typeface="Courier New" panose="02070309020205020404" pitchFamily="49" charset="0"/>
+                <a:cs typeface="Courier New" panose="02070309020205020404" pitchFamily="49" charset="0"/>
+              </a:rPr>
+              <a:t>nlminb</a:t>
+            </a:r>
+            <a:r>
+              <a:rPr lang="en-US" dirty="0"/>
+              <a:t> but can also use </a:t>
+            </a:r>
+            <a:r>
+              <a:rPr lang="en-US" dirty="0" err="1">
+                <a:latin typeface="Courier New" panose="02070309020205020404" pitchFamily="49" charset="0"/>
+                <a:cs typeface="Courier New" panose="02070309020205020404" pitchFamily="49" charset="0"/>
+              </a:rPr>
+              <a:t>optim</a:t>
+            </a:r>
+            <a:endParaRPr lang="en-US" dirty="0">
+              <a:latin typeface="Courier New" panose="02070309020205020404" pitchFamily="49" charset="0"/>
+              <a:cs typeface="Courier New" panose="02070309020205020404" pitchFamily="49" charset="0"/>
+            </a:endParaRPr>
+          </a:p>
+          <a:p>
+            <a:r>
+              <a:rPr lang="en-US" dirty="0"/>
+              <a:t>Allows use of box constraints (more later)</a:t>
+            </a:r>
+          </a:p>
+          <a:p>
+            <a:r>
+              <a:rPr lang="en-US" dirty="0"/>
+              <a:t>We pass it a </a:t>
+            </a:r>
+            <a:r>
+              <a:rPr lang="en-US" dirty="0" smtClean="0"/>
+              <a:t>function</a:t>
+            </a:r>
+            <a:r>
+              <a:rPr lang="en-US" dirty="0"/>
+              <a:t>, it gives us the parameters that minimize it</a:t>
+            </a:r>
+          </a:p>
+          <a:p>
+            <a:r>
+              <a:rPr lang="en-US" dirty="0"/>
+              <a:t>Reminder: accurate gradients really improve optimizer performance</a:t>
+            </a:r>
+          </a:p>
+        </p:txBody>
+      </p:sp>
+      <p:sp>
+        <p:nvSpPr>
+          <p:cNvPr id="4" name="Slide Number Placeholder 3">
+            <a:extLst>
+              <a:ext uri="{FF2B5EF4-FFF2-40B4-BE49-F238E27FC236}">
+                <a16:creationId xmlns:a16="http://schemas.microsoft.com/office/drawing/2014/main" id="{957B730D-CC40-431E-8C8E-D2D52D730BC9}"/>
+              </a:ext>
+            </a:extLst>
+          </p:cNvPr>
+          <p:cNvSpPr>
+            <a:spLocks noGrp="1"/>
+          </p:cNvSpPr>
+          <p:nvPr>
+            <p:ph type="sldNum" sz="quarter" idx="12"/>
+          </p:nvPr>
+        </p:nvSpPr>
+        <p:spPr/>
+        <p:txBody>
+          <a:bodyPr/>
+          <a:lstStyle/>
+          <a:p>
+            <a:fld id="{A90099C9-4CB8-9A40-B745-9AB270505907}" type="slidenum">
+              <a:rPr lang="en-US" smtClean="0"/>
+              <a:t>13</a:t>
+            </a:fld>
+            <a:endParaRPr lang="en-US"/>
+          </a:p>
+        </p:txBody>
+      </p:sp>
+    </p:spTree>
+    <p:extLst>
+      <p:ext uri="{BB962C8B-B14F-4D97-AF65-F5344CB8AC3E}">
+        <p14:creationId xmlns:p14="http://schemas.microsoft.com/office/powerpoint/2010/main" val="1967631098"/>
+      </p:ext>
+    </p:extLst>
+  </p:cSld>
+  <p:clrMapOvr>
+    <a:masterClrMapping/>
+  </p:clrMapOvr>
+</p:sld>
+</file>
+
+<file path=ppt/slides/slide14.xml><?xml version="1.0" encoding="utf-8"?>
+<p:sld xmlns:a="http://schemas.openxmlformats.org/drawingml/2006/main" xmlns:r="http://schemas.openxmlformats.org/officeDocument/2006/relationships" xmlns:p="http://schemas.openxmlformats.org/presentationml/2006/main">
+  <p:cSld>
+    <p:spTree>
+      <p:nvGrpSpPr>
+        <p:cNvPr id="1" name=""/>
+        <p:cNvGrpSpPr/>
+        <p:nvPr/>
+      </p:nvGrpSpPr>
+      <p:grpSpPr>
+        <a:xfrm>
+          <a:off x="0" y="0"/>
+          <a:ext cx="0" cy="0"/>
+          <a:chOff x="0" y="0"/>
+          <a:chExt cx="0" cy="0"/>
+        </a:xfrm>
+      </p:grpSpPr>
+      <p:sp>
+        <p:nvSpPr>
+          <p:cNvPr id="2" name="Title 1">
+            <a:extLst>
+              <a:ext uri="{FF2B5EF4-FFF2-40B4-BE49-F238E27FC236}">
+                <a16:creationId xmlns:a16="http://schemas.microsoft.com/office/drawing/2014/main" id="{316697D2-66C8-404D-8665-0DF135418161}"/>
+              </a:ext>
+            </a:extLst>
+          </p:cNvPr>
+          <p:cNvSpPr>
+            <a:spLocks noGrp="1"/>
+          </p:cNvSpPr>
+          <p:nvPr>
+            <p:ph type="title"/>
+          </p:nvPr>
+        </p:nvSpPr>
+        <p:spPr/>
+        <p:txBody>
+          <a:bodyPr/>
+          <a:lstStyle/>
+          <a:p>
+            <a:r>
+              <a:rPr lang="en-US" dirty="0"/>
+              <a:t>Optimizers in R</a:t>
+            </a:r>
+          </a:p>
+        </p:txBody>
+      </p:sp>
+      <p:sp>
+        <p:nvSpPr>
+          <p:cNvPr id="3" name="Content Placeholder 2">
+            <a:extLst>
+              <a:ext uri="{FF2B5EF4-FFF2-40B4-BE49-F238E27FC236}">
+                <a16:creationId xmlns:a16="http://schemas.microsoft.com/office/drawing/2014/main" id="{D5056ACD-427A-4189-B3CB-53C097C85E0F}"/>
+              </a:ext>
+            </a:extLst>
+          </p:cNvPr>
+          <p:cNvSpPr>
+            <a:spLocks noGrp="1"/>
+          </p:cNvSpPr>
+          <p:nvPr>
+            <p:ph idx="1"/>
+          </p:nvPr>
+        </p:nvSpPr>
+        <p:spPr/>
+        <p:txBody>
+          <a:bodyPr/>
+          <a:lstStyle/>
+          <a:p>
+            <a:pPr marL="0" indent="0">
+              <a:buNone/>
+            </a:pPr>
+            <a:r>
+              <a:rPr lang="en-US" sz="2000" dirty="0">
+                <a:latin typeface="Courier New" panose="02070309020205020404" pitchFamily="49" charset="0"/>
+                <a:cs typeface="Courier New" panose="02070309020205020404" pitchFamily="49" charset="0"/>
+              </a:rPr>
+              <a:t>opt &lt;- </a:t>
+            </a:r>
+            <a:r>
+              <a:rPr lang="en-US" sz="2000" dirty="0" err="1">
+                <a:latin typeface="Courier New" panose="02070309020205020404" pitchFamily="49" charset="0"/>
+                <a:cs typeface="Courier New" panose="02070309020205020404" pitchFamily="49" charset="0"/>
+              </a:rPr>
+              <a:t>nlminb</a:t>
+            </a:r>
+            <a:r>
+              <a:rPr lang="en-US" sz="2000" dirty="0">
+                <a:latin typeface="Courier New" panose="02070309020205020404" pitchFamily="49" charset="0"/>
+                <a:cs typeface="Courier New" panose="02070309020205020404" pitchFamily="49" charset="0"/>
+              </a:rPr>
+              <a:t>(start=1, objective=f, gradient=</a:t>
+            </a:r>
+            <a:r>
+              <a:rPr lang="en-US" sz="2000" dirty="0" err="1">
+                <a:latin typeface="Courier New" panose="02070309020205020404" pitchFamily="49" charset="0"/>
+                <a:cs typeface="Courier New" panose="02070309020205020404" pitchFamily="49" charset="0"/>
+              </a:rPr>
+              <a:t>fprime</a:t>
+            </a:r>
+            <a:r>
+              <a:rPr lang="en-US" sz="2000" dirty="0">
+                <a:latin typeface="Courier New" panose="02070309020205020404" pitchFamily="49" charset="0"/>
+                <a:cs typeface="Courier New" panose="02070309020205020404" pitchFamily="49" charset="0"/>
+              </a:rPr>
+              <a:t>)</a:t>
+            </a:r>
+          </a:p>
+          <a:p>
+            <a:pPr marL="0" indent="0">
+              <a:buNone/>
+            </a:pPr>
+            <a:r>
+              <a:rPr lang="en-US" sz="2000" dirty="0" err="1">
+                <a:latin typeface="Courier New" panose="02070309020205020404" pitchFamily="49" charset="0"/>
+                <a:cs typeface="Courier New" panose="02070309020205020404" pitchFamily="49" charset="0"/>
+              </a:rPr>
+              <a:t>opt$par</a:t>
+            </a:r>
+            <a:endParaRPr lang="en-US" sz="2000" dirty="0">
+              <a:latin typeface="Courier New" panose="02070309020205020404" pitchFamily="49" charset="0"/>
+              <a:cs typeface="Courier New" panose="02070309020205020404" pitchFamily="49" charset="0"/>
+            </a:endParaRPr>
+          </a:p>
+          <a:p>
+            <a:pPr marL="0" indent="0">
+              <a:buNone/>
+            </a:pPr>
+            <a:r>
+              <a:rPr lang="en-US" sz="2000" dirty="0">
+                <a:latin typeface="Courier New" panose="02070309020205020404" pitchFamily="49" charset="0"/>
+                <a:cs typeface="Courier New" panose="02070309020205020404" pitchFamily="49" charset="0"/>
+              </a:rPr>
+              <a:t>f(</a:t>
+            </a:r>
+            <a:r>
+              <a:rPr lang="en-US" sz="2000" dirty="0" err="1">
+                <a:latin typeface="Courier New" panose="02070309020205020404" pitchFamily="49" charset="0"/>
+                <a:cs typeface="Courier New" panose="02070309020205020404" pitchFamily="49" charset="0"/>
+              </a:rPr>
+              <a:t>opt$par</a:t>
+            </a:r>
+            <a:r>
+              <a:rPr lang="en-US" sz="2000" dirty="0">
+                <a:latin typeface="Courier New" panose="02070309020205020404" pitchFamily="49" charset="0"/>
+                <a:cs typeface="Courier New" panose="02070309020205020404" pitchFamily="49" charset="0"/>
+              </a:rPr>
+              <a:t>)</a:t>
+            </a:r>
+          </a:p>
+          <a:p>
+            <a:pPr marL="0" indent="0">
+              <a:buNone/>
+            </a:pPr>
+            <a:r>
+              <a:rPr lang="en-US" sz="2000" dirty="0" err="1">
+                <a:latin typeface="Courier New" panose="02070309020205020404" pitchFamily="49" charset="0"/>
+                <a:cs typeface="Courier New" panose="02070309020205020404" pitchFamily="49" charset="0"/>
+              </a:rPr>
+              <a:t>fprime</a:t>
+            </a:r>
+            <a:r>
+              <a:rPr lang="en-US" sz="2000" dirty="0">
+                <a:latin typeface="Courier New" panose="02070309020205020404" pitchFamily="49" charset="0"/>
+                <a:cs typeface="Courier New" panose="02070309020205020404" pitchFamily="49" charset="0"/>
+              </a:rPr>
+              <a:t>(</a:t>
+            </a:r>
+            <a:r>
+              <a:rPr lang="en-US" sz="2000" dirty="0" err="1">
+                <a:latin typeface="Courier New" panose="02070309020205020404" pitchFamily="49" charset="0"/>
+                <a:cs typeface="Courier New" panose="02070309020205020404" pitchFamily="49" charset="0"/>
+              </a:rPr>
+              <a:t>opt$par</a:t>
+            </a:r>
+            <a:r>
+              <a:rPr lang="en-US" sz="2000" dirty="0">
+                <a:latin typeface="Courier New" panose="02070309020205020404" pitchFamily="49" charset="0"/>
+                <a:cs typeface="Courier New" panose="02070309020205020404" pitchFamily="49" charset="0"/>
+              </a:rPr>
+              <a:t>)</a:t>
+            </a:r>
+          </a:p>
+          <a:p>
+            <a:pPr marL="0" indent="0">
+              <a:buNone/>
+            </a:pPr>
+            <a:endParaRPr lang="en-US" sz="2000" dirty="0" smtClean="0">
+              <a:latin typeface="Courier New" panose="02070309020205020404" pitchFamily="49" charset="0"/>
+              <a:cs typeface="Courier New" panose="02070309020205020404" pitchFamily="49" charset="0"/>
+            </a:endParaRPr>
+          </a:p>
+          <a:p>
+            <a:pPr marL="0" indent="0">
+              <a:buNone/>
+            </a:pPr>
+            <a:r>
+              <a:rPr lang="en-US" sz="2000" dirty="0" smtClean="0">
+                <a:latin typeface="Courier New" panose="02070309020205020404" pitchFamily="49" charset="0"/>
+                <a:cs typeface="Courier New" panose="02070309020205020404" pitchFamily="49" charset="0"/>
+              </a:rPr>
+              <a:t>opt </a:t>
+            </a:r>
+            <a:r>
+              <a:rPr lang="en-US" sz="2000" dirty="0">
+                <a:latin typeface="Courier New" panose="02070309020205020404" pitchFamily="49" charset="0"/>
+                <a:cs typeface="Courier New" panose="02070309020205020404" pitchFamily="49" charset="0"/>
+              </a:rPr>
+              <a:t>&lt;- </a:t>
+            </a:r>
+            <a:r>
+              <a:rPr lang="en-US" sz="2000" dirty="0" err="1" smtClean="0">
+                <a:latin typeface="Courier New" panose="02070309020205020404" pitchFamily="49" charset="0"/>
+                <a:cs typeface="Courier New" panose="02070309020205020404" pitchFamily="49" charset="0"/>
+              </a:rPr>
+              <a:t>nlminb</a:t>
+            </a:r>
+            <a:r>
+              <a:rPr lang="en-US" sz="2000" dirty="0" smtClean="0">
+                <a:latin typeface="Courier New" panose="02070309020205020404" pitchFamily="49" charset="0"/>
+                <a:cs typeface="Courier New" panose="02070309020205020404" pitchFamily="49" charset="0"/>
+              </a:rPr>
+              <a:t>(</a:t>
+            </a:r>
+            <a:r>
+              <a:rPr lang="en-US" sz="2000" dirty="0" err="1" smtClean="0">
+                <a:latin typeface="Courier New" panose="02070309020205020404" pitchFamily="49" charset="0"/>
+                <a:cs typeface="Courier New" panose="02070309020205020404" pitchFamily="49" charset="0"/>
+              </a:rPr>
+              <a:t>obj$par</a:t>
+            </a:r>
+            <a:r>
+              <a:rPr lang="en-US" sz="2000" dirty="0" smtClean="0">
+                <a:latin typeface="Courier New" panose="02070309020205020404" pitchFamily="49" charset="0"/>
+                <a:cs typeface="Courier New" panose="02070309020205020404" pitchFamily="49" charset="0"/>
+              </a:rPr>
+              <a:t>, objective=</a:t>
+            </a:r>
+            <a:r>
+              <a:rPr lang="en-US" sz="2000" dirty="0" err="1" smtClean="0">
+                <a:latin typeface="Courier New" panose="02070309020205020404" pitchFamily="49" charset="0"/>
+                <a:cs typeface="Courier New" panose="02070309020205020404" pitchFamily="49" charset="0"/>
+              </a:rPr>
+              <a:t>obj$fn</a:t>
+            </a:r>
+            <a:r>
+              <a:rPr lang="en-US" sz="2000" dirty="0">
+                <a:latin typeface="Courier New" panose="02070309020205020404" pitchFamily="49" charset="0"/>
+                <a:cs typeface="Courier New" panose="02070309020205020404" pitchFamily="49" charset="0"/>
+              </a:rPr>
+              <a:t>, </a:t>
+            </a:r>
+            <a:r>
+              <a:rPr lang="en-US" sz="2000" dirty="0" smtClean="0">
+                <a:latin typeface="Courier New" panose="02070309020205020404" pitchFamily="49" charset="0"/>
+                <a:cs typeface="Courier New" panose="02070309020205020404" pitchFamily="49" charset="0"/>
+              </a:rPr>
+              <a:t>    		        gradient=</a:t>
+            </a:r>
+            <a:r>
+              <a:rPr lang="en-US" sz="2000" dirty="0" err="1" smtClean="0">
+                <a:latin typeface="Courier New" panose="02070309020205020404" pitchFamily="49" charset="0"/>
+                <a:cs typeface="Courier New" panose="02070309020205020404" pitchFamily="49" charset="0"/>
+              </a:rPr>
+              <a:t>obj$gr</a:t>
+            </a:r>
+            <a:r>
+              <a:rPr lang="en-US" sz="2000" dirty="0">
+                <a:latin typeface="Courier New" panose="02070309020205020404" pitchFamily="49" charset="0"/>
+                <a:cs typeface="Courier New" panose="02070309020205020404" pitchFamily="49" charset="0"/>
+              </a:rPr>
+              <a:t>)</a:t>
+            </a:r>
+          </a:p>
+          <a:p>
+            <a:pPr marL="0" indent="0">
+              <a:buNone/>
+            </a:pPr>
+            <a:r>
+              <a:rPr lang="en-US" sz="2000" dirty="0" err="1">
+                <a:latin typeface="Courier New" panose="02070309020205020404" pitchFamily="49" charset="0"/>
+                <a:cs typeface="Courier New" panose="02070309020205020404" pitchFamily="49" charset="0"/>
+              </a:rPr>
+              <a:t>opt$par</a:t>
+            </a:r>
+            <a:endParaRPr lang="en-US" sz="2000" dirty="0">
+              <a:latin typeface="Courier New" panose="02070309020205020404" pitchFamily="49" charset="0"/>
+              <a:cs typeface="Courier New" panose="02070309020205020404" pitchFamily="49" charset="0"/>
+            </a:endParaRPr>
+          </a:p>
+          <a:p>
+            <a:pPr marL="0" indent="0">
+              <a:buNone/>
+            </a:pPr>
+            <a:r>
+              <a:rPr lang="en-US" sz="2000" dirty="0" err="1">
+                <a:latin typeface="Courier New" panose="02070309020205020404" pitchFamily="49" charset="0"/>
+                <a:cs typeface="Courier New" panose="02070309020205020404" pitchFamily="49" charset="0"/>
+              </a:rPr>
+              <a:t>obj$fn</a:t>
+            </a:r>
+            <a:r>
+              <a:rPr lang="en-US" sz="2000" dirty="0">
+                <a:latin typeface="Courier New" panose="02070309020205020404" pitchFamily="49" charset="0"/>
+                <a:cs typeface="Courier New" panose="02070309020205020404" pitchFamily="49" charset="0"/>
+              </a:rPr>
+              <a:t>(</a:t>
+            </a:r>
+            <a:r>
+              <a:rPr lang="en-US" sz="2000" dirty="0" err="1">
+                <a:latin typeface="Courier New" panose="02070309020205020404" pitchFamily="49" charset="0"/>
+                <a:cs typeface="Courier New" panose="02070309020205020404" pitchFamily="49" charset="0"/>
+              </a:rPr>
+              <a:t>opt$par</a:t>
+            </a:r>
+            <a:r>
+              <a:rPr lang="en-US" sz="2000" dirty="0">
+                <a:latin typeface="Courier New" panose="02070309020205020404" pitchFamily="49" charset="0"/>
+                <a:cs typeface="Courier New" panose="02070309020205020404" pitchFamily="49" charset="0"/>
+              </a:rPr>
+              <a:t>)</a:t>
+            </a:r>
+          </a:p>
+          <a:p>
+            <a:pPr marL="0" indent="0">
+              <a:buNone/>
+            </a:pPr>
+            <a:r>
+              <a:rPr lang="en-US" sz="2000" dirty="0" err="1">
+                <a:latin typeface="Courier New" panose="02070309020205020404" pitchFamily="49" charset="0"/>
+                <a:cs typeface="Courier New" panose="02070309020205020404" pitchFamily="49" charset="0"/>
+              </a:rPr>
+              <a:t>obj$gr</a:t>
+            </a:r>
+            <a:r>
+              <a:rPr lang="en-US" sz="2000" dirty="0">
+                <a:latin typeface="Courier New" panose="02070309020205020404" pitchFamily="49" charset="0"/>
+                <a:cs typeface="Courier New" panose="02070309020205020404" pitchFamily="49" charset="0"/>
+              </a:rPr>
+              <a:t>(</a:t>
+            </a:r>
+            <a:r>
+              <a:rPr lang="en-US" sz="2000" dirty="0" err="1">
+                <a:latin typeface="Courier New" panose="02070309020205020404" pitchFamily="49" charset="0"/>
+                <a:cs typeface="Courier New" panose="02070309020205020404" pitchFamily="49" charset="0"/>
+              </a:rPr>
+              <a:t>opt$par</a:t>
+            </a:r>
+            <a:r>
+              <a:rPr lang="en-US" sz="2000" dirty="0" smtClean="0">
+                <a:latin typeface="Courier New" panose="02070309020205020404" pitchFamily="49" charset="0"/>
+                <a:cs typeface="Courier New" panose="02070309020205020404" pitchFamily="49" charset="0"/>
+              </a:rPr>
+              <a:t>)</a:t>
+            </a:r>
+            <a:endParaRPr lang="en-US" sz="2000" dirty="0">
+              <a:latin typeface="Courier New" panose="02070309020205020404" pitchFamily="49" charset="0"/>
+              <a:cs typeface="Courier New" panose="02070309020205020404" pitchFamily="49" charset="0"/>
+            </a:endParaRPr>
+          </a:p>
+        </p:txBody>
+      </p:sp>
+      <p:sp>
+        <p:nvSpPr>
+          <p:cNvPr id="4" name="Slide Number Placeholder 3">
+            <a:extLst>
+              <a:ext uri="{FF2B5EF4-FFF2-40B4-BE49-F238E27FC236}">
+                <a16:creationId xmlns:a16="http://schemas.microsoft.com/office/drawing/2014/main" id="{957B730D-CC40-431E-8C8E-D2D52D730BC9}"/>
+              </a:ext>
+            </a:extLst>
+          </p:cNvPr>
+          <p:cNvSpPr>
+            <a:spLocks noGrp="1"/>
+          </p:cNvSpPr>
+          <p:nvPr>
+            <p:ph type="sldNum" sz="quarter" idx="12"/>
+          </p:nvPr>
+        </p:nvSpPr>
+        <p:spPr/>
+        <p:txBody>
+          <a:bodyPr/>
+          <a:lstStyle/>
+          <a:p>
+            <a:fld id="{A90099C9-4CB8-9A40-B745-9AB270505907}" type="slidenum">
+              <a:rPr lang="en-US" smtClean="0"/>
+              <a:t>14</a:t>
+            </a:fld>
+            <a:endParaRPr lang="en-US"/>
+          </a:p>
+        </p:txBody>
+      </p:sp>
+    </p:spTree>
+    <p:extLst>
+      <p:ext uri="{BB962C8B-B14F-4D97-AF65-F5344CB8AC3E}">
+        <p14:creationId xmlns:p14="http://schemas.microsoft.com/office/powerpoint/2010/main" val="403582198"/>
+      </p:ext>
+    </p:extLst>
+  </p:cSld>
+  <p:clrMapOvr>
+    <a:masterClrMapping/>
+  </p:clrMapOvr>
+</p:sld>
+</file>
+
+<file path=ppt/slides/slide15.xml><?xml version="1.0" encoding="utf-8"?>
+<p:sld xmlns:a="http://schemas.openxmlformats.org/drawingml/2006/main" xmlns:r="http://schemas.openxmlformats.org/officeDocument/2006/relationships" xmlns:p="http://schemas.openxmlformats.org/presentationml/2006/main">
+  <p:cSld>
+    <p:spTree>
+      <p:nvGrpSpPr>
+        <p:cNvPr id="1" name=""/>
+        <p:cNvGrpSpPr/>
+        <p:nvPr/>
+      </p:nvGrpSpPr>
+      <p:grpSpPr>
+        <a:xfrm>
+          <a:off x="0" y="0"/>
+          <a:ext cx="0" cy="0"/>
+          <a:chOff x="0" y="0"/>
+          <a:chExt cx="0" cy="0"/>
+        </a:xfrm>
+      </p:grpSpPr>
+      <p:sp>
+        <p:nvSpPr>
           <p:cNvPr id="2" name="Title 1">
             <a:extLst>
               <a:ext uri="{FF2B5EF4-FFF2-40B4-BE49-F238E27FC236}">
@@ -6388,7 +7395,15 @@
           <a:p>
             <a:r>
               <a:rPr lang="en-US" dirty="0"/>
-              <a:t>How can we calculate derivative of this?</a:t>
+              <a:t>How </a:t>
+            </a:r>
+            <a:r>
+              <a:rPr lang="en-US" dirty="0" smtClean="0"/>
+              <a:t>could </a:t>
+            </a:r>
+            <a:r>
+              <a:rPr lang="en-US" dirty="0"/>
+              <a:t>we calculate derivative of this?</a:t>
             </a:r>
           </a:p>
           <a:p>
@@ -6594,7 +7609,7 @@
           <a:graphicData uri="http://schemas.openxmlformats.org/presentationml/2006/ole">
             <mc:AlternateContent xmlns:mc="http://schemas.openxmlformats.org/markup-compatibility/2006">
               <mc:Choice xmlns:v="urn:schemas-microsoft-com:vml" Requires="v">
-                <p:oleObj spid="_x0000_s3075" name="Equation" r:id="rId3" imgW="2209680" imgH="253800" progId="Equation.DSMT4">
+                <p:oleObj spid="_x0000_s3081" name="Equation" r:id="rId3" imgW="2209680" imgH="253800" progId="Equation.DSMT4">
                   <p:embed/>
                 </p:oleObj>
               </mc:Choice>
@@ -6764,7 +7779,7 @@
           <a:p>
             <a:fld id="{A90099C9-4CB8-9A40-B745-9AB270505907}" type="slidenum">
               <a:rPr lang="en-US" smtClean="0"/>
-              <a:t>12</a:t>
+              <a:t>15</a:t>
             </a:fld>
             <a:endParaRPr lang="en-US"/>
           </a:p>
@@ -7093,7 +8108,7 @@
 </p:sld>
 </file>
 
-<file path=ppt/slides/slide13.xml><?xml version="1.0" encoding="utf-8"?>
+<file path=ppt/slides/slide16.xml><?xml version="1.0" encoding="utf-8"?>
 <p:sld xmlns:a="http://schemas.openxmlformats.org/drawingml/2006/main" xmlns:r="http://schemas.openxmlformats.org/officeDocument/2006/relationships" xmlns:p="http://schemas.openxmlformats.org/presentationml/2006/main">
   <p:cSld>
     <p:spTree>
@@ -7253,7 +8268,7 @@
           <a:p>
             <a:fld id="{A90099C9-4CB8-9A40-B745-9AB270505907}" type="slidenum">
               <a:rPr lang="en-US" smtClean="0"/>
-              <a:t>13</a:t>
+              <a:t>16</a:t>
             </a:fld>
             <a:endParaRPr lang="en-US"/>
           </a:p>
@@ -7272,7 +8287,7 @@
 </p:sld>
 </file>
 
-<file path=ppt/slides/slide14.xml><?xml version="1.0" encoding="utf-8"?>
+<file path=ppt/slides/slide17.xml><?xml version="1.0" encoding="utf-8"?>
 <p:sld xmlns:a="http://schemas.openxmlformats.org/drawingml/2006/main" xmlns:r="http://schemas.openxmlformats.org/officeDocument/2006/relationships" xmlns:p="http://schemas.openxmlformats.org/presentationml/2006/main">
   <p:cSld>
     <p:spTree>
@@ -7344,48 +8359,71 @@
           <a:lstStyle/>
           <a:p>
             <a:r>
+              <a:rPr lang="en-US" dirty="0" smtClean="0"/>
+              <a:t>Numerical optimization is finding the minimum of a function</a:t>
+            </a:r>
+          </a:p>
+          <a:p>
+            <a:r>
               <a:rPr lang="en-US" dirty="0"/>
-              <a:t>To “fit” statistical models we minimize the </a:t>
+              <a:t>Optimization is better with gradients, and TMB calculates those </a:t>
+            </a:r>
+            <a:r>
+              <a:rPr lang="en-US" dirty="0" smtClean="0"/>
+              <a:t>automatically:</a:t>
+            </a:r>
+          </a:p>
+          <a:p>
+            <a:pPr lvl="1"/>
+            <a:r>
+              <a:rPr lang="en-US" dirty="0" smtClean="0"/>
+              <a:t>For extremely complex functions</a:t>
+            </a:r>
+          </a:p>
+          <a:p>
+            <a:pPr lvl="1"/>
+            <a:r>
+              <a:rPr lang="en-US" dirty="0" smtClean="0"/>
+              <a:t>With thousands of parameters</a:t>
+            </a:r>
+          </a:p>
+          <a:p>
+            <a:pPr lvl="1"/>
+            <a:r>
+              <a:rPr lang="en-US" dirty="0" smtClean="0"/>
+              <a:t>Integrating parameters subsets (more later)</a:t>
+            </a:r>
+            <a:endParaRPr lang="en-US" dirty="0"/>
+          </a:p>
+          <a:p>
+            <a:r>
+              <a:rPr lang="en-US" dirty="0" smtClean="0"/>
+              <a:t>To </a:t>
+            </a:r>
+            <a:r>
+              <a:rPr lang="en-US" dirty="0"/>
+              <a:t>“fit” statistical models we </a:t>
+            </a:r>
+            <a:r>
+              <a:rPr lang="en-US" dirty="0" smtClean="0"/>
+              <a:t>will minimize </a:t>
+            </a:r>
+            <a:r>
+              <a:rPr lang="en-US" dirty="0"/>
+              <a:t>the </a:t>
             </a:r>
             <a:br>
               <a:rPr lang="en-US" dirty="0"/>
             </a:br>
             <a:r>
               <a:rPr lang="en-US" dirty="0"/>
-              <a:t>–log-likelihood to find the MLE</a:t>
-            </a:r>
-          </a:p>
-          <a:p>
-            <a:r>
-              <a:rPr lang="en-US" dirty="0"/>
-              <a:t>We often minimize the NLL numerically</a:t>
-            </a:r>
-          </a:p>
-          <a:p>
-            <a:r>
-              <a:rPr lang="en-US" dirty="0"/>
-              <a:t>Optimization is better with gradients, and TMB calculates those easily</a:t>
-            </a:r>
-          </a:p>
-          <a:p>
-            <a:r>
-              <a:rPr lang="en-US" dirty="0"/>
-              <a:t>We use </a:t>
-            </a:r>
-            <a:r>
-              <a:rPr lang="en-US" dirty="0" err="1"/>
-              <a:t>exp</a:t>
-            </a:r>
-            <a:r>
-              <a:rPr lang="en-US" dirty="0"/>
-              <a:t>() to keep parameters positive</a:t>
-            </a:r>
-          </a:p>
-          <a:p>
-            <a:r>
-              <a:rPr lang="en-US" dirty="0"/>
-              <a:t>The MLE variance is biased</a:t>
-            </a:r>
+              <a:t>–log-likelihood to find the </a:t>
+            </a:r>
+            <a:r>
+              <a:rPr lang="en-US" dirty="0" smtClean="0"/>
+              <a:t>MLE</a:t>
+            </a:r>
+            <a:endParaRPr lang="en-US" dirty="0"/>
           </a:p>
         </p:txBody>
       </p:sp>
@@ -7412,16 +8450,16 @@
           <a:p>
             <a:fld id="{A90099C9-4CB8-9A40-B745-9AB270505907}" type="slidenum">
               <a:rPr lang="en-US" smtClean="0"/>
-              <a:t>14</a:t>
+              <a:t>17</a:t>
             </a:fld>
-            <a:endParaRPr lang="en-US"/>
+            <a:endParaRPr lang="en-US" dirty="0"/>
           </a:p>
         </p:txBody>
       </p:sp>
     </p:spTree>
     <p:extLst>
       <p:ext uri="{BB962C8B-B14F-4D97-AF65-F5344CB8AC3E}">
-        <p14:creationId xmlns:p14="http://schemas.microsoft.com/office/powerpoint/2010/main" val="2487132151"/>
+        <p14:creationId xmlns:p14="http://schemas.microsoft.com/office/powerpoint/2010/main" val="396224560"/>
       </p:ext>
     </p:extLst>
   </p:cSld>
@@ -7431,7 +8469,7 @@
 </p:sld>
 </file>
 
-<file path=ppt/slides/slide15.xml><?xml version="1.0" encoding="utf-8"?>
+<file path=ppt/slides/slide18.xml><?xml version="1.0" encoding="utf-8"?>
 <p:sld xmlns:a="http://schemas.openxmlformats.org/drawingml/2006/main" xmlns:r="http://schemas.openxmlformats.org/officeDocument/2006/relationships" xmlns:p="http://schemas.openxmlformats.org/presentationml/2006/main">
   <p:cSld>
     <p:spTree>
@@ -7524,7 +8562,7 @@
           <a:p>
             <a:fld id="{A90099C9-4CB8-9A40-B745-9AB270505907}" type="slidenum">
               <a:rPr lang="en-US" smtClean="0"/>
-              <a:t>15</a:t>
+              <a:t>18</a:t>
             </a:fld>
             <a:endParaRPr lang="en-US"/>
           </a:p>
@@ -7582,8 +8620,12 @@
           <a:lstStyle/>
           <a:p>
             <a:r>
+              <a:rPr lang="en-US" dirty="0" smtClean="0"/>
+              <a:t>Function </a:t>
+            </a:r>
+            <a:r>
               <a:rPr lang="en-US" dirty="0"/>
-              <a:t>Review: Function minimization</a:t>
+              <a:t>minimization</a:t>
             </a:r>
           </a:p>
         </p:txBody>
@@ -8195,7 +9237,7 @@
           <a:graphicData uri="http://schemas.openxmlformats.org/presentationml/2006/ole">
             <mc:AlternateContent xmlns:mc="http://schemas.openxmlformats.org/markup-compatibility/2006">
               <mc:Choice xmlns:v="urn:schemas-microsoft-com:vml" Requires="v">
-                <p:oleObj spid="_x0000_s2074" name="Equation" r:id="rId4" imgW="2209680" imgH="253800" progId="Equation.DSMT4">
+                <p:oleObj spid="_x0000_s2080" name="Equation" r:id="rId4" imgW="2209680" imgH="253800" progId="Equation.DSMT4">
                   <p:embed/>
                 </p:oleObj>
               </mc:Choice>

</xml_diff>